<commit_message>
CDR done except for PCB
</commit_message>
<xml_diff>
--- a/DESIGN_DOCUMENTATION/Critical_Design_Review.Flux_Capacitors.pptx
+++ b/DESIGN_DOCUMENTATION/Critical_Design_Review.Flux_Capacitors.pptx
@@ -116,6 +116,11 @@
       </a:defRPr>
     </a:lvl9pPr>
   </p:defaultTextStyle>
+  <p:extLst>
+    <p:ext uri="{EFAFB233-063F-42B5-8137-9DF3F51BA10A}">
+      <p15:sldGuideLst xmlns:p15="http://schemas.microsoft.com/office/powerpoint/2012/main"/>
+    </p:ext>
+  </p:extLst>
 </p:presentation>
 </file>
 
@@ -3443,7 +3448,9 @@
           </a:xfrm>
         </p:spPr>
         <p:txBody>
-          <a:bodyPr/>
+          <a:bodyPr>
+            <a:normAutofit fontScale="85000" lnSpcReduction="20000"/>
+          </a:bodyPr>
           <a:lstStyle/>
           <a:p>
             <a:r>
@@ -3482,17 +3489,51 @@
               <a:rPr lang="en-US" dirty="0" smtClean="0"/>
               <a:t>PCB Design</a:t>
             </a:r>
-            <a:endParaRPr lang="en-US" dirty="0" smtClean="0"/>
-          </a:p>
-          <a:p>
-            <a:r>
-              <a:rPr lang="en-US" dirty="0" smtClean="0"/>
-              <a:t>We chose to divide it up like so, because Calvin has more familiarity with the function of the ignition system.</a:t>
-            </a:r>
+          </a:p>
+          <a:p>
+            <a:r>
+              <a:rPr lang="en-US" dirty="0" smtClean="0"/>
+              <a:t>We chose to divide it up like so, because Calvin has more familiarity with the function of the ignition system</a:t>
+            </a:r>
+            <a:r>
+              <a:rPr lang="en-US" dirty="0" smtClean="0"/>
+              <a:t>.</a:t>
+            </a:r>
+          </a:p>
+          <a:p>
             <a:endParaRPr lang="en-US" dirty="0"/>
           </a:p>
           <a:p>
-            <a:endParaRPr lang="en-US" dirty="0" smtClean="0"/>
+            <a:pPr marL="0" indent="0">
+              <a:buNone/>
+            </a:pPr>
+            <a:r>
+              <a:rPr lang="en-US" sz="5200" dirty="0" smtClean="0">
+                <a:latin typeface="+mj-lt"/>
+              </a:rPr>
+              <a:t>Schedule</a:t>
+            </a:r>
+          </a:p>
+          <a:p>
+            <a:pPr lvl="1"/>
+            <a:r>
+              <a:rPr lang="en-US" dirty="0" smtClean="0"/>
+              <a:t>We plan to have the device tested and working over spring break.</a:t>
+            </a:r>
+          </a:p>
+          <a:p>
+            <a:pPr lvl="1"/>
+            <a:r>
+              <a:rPr lang="en-US" dirty="0" smtClean="0"/>
+              <a:t>Once we have verified functionality, we will begin integrating the manifold pressure, and other analog/digital sensors.</a:t>
+            </a:r>
+          </a:p>
+          <a:p>
+            <a:pPr lvl="1"/>
+            <a:r>
+              <a:rPr lang="en-US" dirty="0" smtClean="0"/>
+              <a:t>We will then begin case design.</a:t>
+            </a:r>
           </a:p>
         </p:txBody>
       </p:sp>
@@ -4019,7 +4060,49 @@
           <a:bodyPr/>
           <a:lstStyle/>
           <a:p>
+            <a:pPr marL="0" indent="0">
+              <a:buNone/>
+            </a:pPr>
+            <a:r>
+              <a:rPr lang="en-US" dirty="0"/>
+              <a:t>1.  </a:t>
+            </a:r>
+            <a:r>
+              <a:rPr lang="en-US" dirty="0" smtClean="0"/>
+              <a:t> Check manifold pressure</a:t>
+            </a:r>
             <a:endParaRPr lang="en-US" dirty="0"/>
+          </a:p>
+          <a:p>
+            <a:pPr marL="0" indent="0">
+              <a:buNone/>
+            </a:pPr>
+            <a:r>
+              <a:rPr lang="en-US" dirty="0"/>
+              <a:t>2.   </a:t>
+            </a:r>
+            <a:r>
+              <a:rPr lang="en-US" dirty="0" smtClean="0"/>
+              <a:t>Get RPM</a:t>
+            </a:r>
+          </a:p>
+          <a:p>
+            <a:pPr marL="514350" indent="-514350">
+              <a:buAutoNum type="arabicPeriod" startAt="3"/>
+            </a:pPr>
+            <a:r>
+              <a:rPr lang="en-US" dirty="0" smtClean="0"/>
+              <a:t>Lookup Requested Delay</a:t>
+            </a:r>
+          </a:p>
+          <a:p>
+            <a:pPr marL="514350" indent="-514350">
+              <a:buAutoNum type="arabicPeriod" startAt="3"/>
+            </a:pPr>
+            <a:r>
+              <a:rPr lang="en-US" dirty="0" smtClean="0"/>
+              <a:t>Wait for negative edge on ignition signal line.</a:t>
+            </a:r>
           </a:p>
         </p:txBody>
       </p:sp>
@@ -4063,7 +4146,12 @@
             <p:ph type="title"/>
           </p:nvPr>
         </p:nvSpPr>
-        <p:spPr/>
+        <p:spPr>
+          <a:xfrm>
+            <a:off x="838200" y="0"/>
+            <a:ext cx="10515600" cy="1077309"/>
+          </a:xfrm>
+        </p:spPr>
         <p:txBody>
           <a:bodyPr/>
           <a:lstStyle/>
@@ -4086,15 +4174,130 @@
             <p:ph idx="1"/>
           </p:nvPr>
         </p:nvSpPr>
-        <p:spPr/>
-        <p:txBody>
-          <a:bodyPr/>
-          <a:lstStyle/>
-          <a:p>
+        <p:spPr>
+          <a:xfrm>
+            <a:off x="838200" y="3338681"/>
+            <a:ext cx="10515600" cy="3190908"/>
+          </a:xfrm>
+        </p:spPr>
+        <p:txBody>
+          <a:bodyPr>
+            <a:normAutofit fontScale="70000" lnSpcReduction="20000"/>
+          </a:bodyPr>
+          <a:lstStyle/>
+          <a:p>
+            <a:r>
+              <a:rPr lang="en-US" dirty="0"/>
+              <a:t>In order to charge the coil and discharge at the proper time, the code must </a:t>
+            </a:r>
+            <a:r>
+              <a:rPr lang="en-US" dirty="0" smtClean="0"/>
+              <a:t> predict when the coil needs to begin charging for the next cycle before it has any information on when the next cycle is beginning. Engine speed changes slowly in relation to RPM, so this yields very accurate results.</a:t>
+            </a:r>
+          </a:p>
+          <a:p>
+            <a:pPr marL="0" indent="0">
+              <a:buNone/>
+            </a:pPr>
+            <a:r>
+              <a:rPr lang="en-US" dirty="0" smtClean="0"/>
+              <a:t>Continuing the Algorith</a:t>
+            </a:r>
+            <a:r>
+              <a:rPr lang="en-US" dirty="0"/>
+              <a:t>m</a:t>
+            </a:r>
+            <a:endParaRPr lang="en-US" dirty="0" smtClean="0"/>
+          </a:p>
+          <a:p>
+            <a:pPr marL="514350" indent="-514350">
+              <a:buAutoNum type="arabicPeriod" startAt="4"/>
+            </a:pPr>
+            <a:r>
+              <a:rPr lang="en-US" dirty="0"/>
+              <a:t>C</a:t>
+            </a:r>
+            <a:r>
+              <a:rPr lang="en-US" dirty="0" smtClean="0"/>
+              <a:t>alculate each of the delays</a:t>
+            </a:r>
+          </a:p>
+          <a:p>
+            <a:pPr marL="514350" indent="-514350">
+              <a:buAutoNum type="arabicPeriod" startAt="4"/>
+            </a:pPr>
+            <a:r>
+              <a:rPr lang="en-US" dirty="0"/>
+              <a:t>E</a:t>
+            </a:r>
+            <a:r>
+              <a:rPr lang="en-US" dirty="0" smtClean="0"/>
+              <a:t>xecute the first delay</a:t>
+            </a:r>
+          </a:p>
+          <a:p>
+            <a:pPr marL="514350" indent="-514350">
+              <a:buAutoNum type="arabicPeriod" startAt="4"/>
+            </a:pPr>
+            <a:r>
+              <a:rPr lang="en-US" dirty="0" smtClean="0"/>
+              <a:t>Bring output low</a:t>
+            </a:r>
+          </a:p>
+          <a:p>
+            <a:pPr marL="514350" indent="-514350">
+              <a:buAutoNum type="arabicPeriod" startAt="4"/>
+            </a:pPr>
+            <a:r>
+              <a:rPr lang="en-US" dirty="0" smtClean="0"/>
+              <a:t>Execute second delay</a:t>
+            </a:r>
+          </a:p>
+          <a:p>
+            <a:pPr marL="514350" indent="-514350">
+              <a:buAutoNum type="arabicPeriod" startAt="4"/>
+            </a:pPr>
+            <a:r>
+              <a:rPr lang="en-US" dirty="0" smtClean="0"/>
+              <a:t>Bring output high</a:t>
+            </a:r>
+          </a:p>
+          <a:p>
+            <a:pPr marL="514350" indent="-514350">
+              <a:buAutoNum type="arabicPeriod" startAt="4"/>
+            </a:pPr>
+            <a:r>
+              <a:rPr lang="en-US" dirty="0" smtClean="0"/>
+              <a:t>Repeat</a:t>
+            </a:r>
             <a:endParaRPr lang="en-US" dirty="0"/>
           </a:p>
         </p:txBody>
       </p:sp>
+      <p:pic>
+        <p:nvPicPr>
+          <p:cNvPr id="4" name="Picture 3"/>
+          <p:cNvPicPr>
+            <a:picLocks noChangeAspect="1"/>
+          </p:cNvPicPr>
+          <p:nvPr/>
+        </p:nvPicPr>
+        <p:blipFill>
+          <a:blip r:embed="rId2"/>
+          <a:stretch>
+            <a:fillRect/>
+          </a:stretch>
+        </p:blipFill>
+        <p:spPr>
+          <a:xfrm>
+            <a:off x="2591880" y="906832"/>
+            <a:ext cx="7008240" cy="2431849"/>
+          </a:xfrm>
+          <a:prstGeom prst="rect">
+            <a:avLst/>
+          </a:prstGeom>
+        </p:spPr>
+      </p:pic>
     </p:spTree>
     <p:extLst>
       <p:ext uri="{BB962C8B-B14F-4D97-AF65-F5344CB8AC3E}">
@@ -4135,18 +4338,19 @@
             <p:ph type="title"/>
           </p:nvPr>
         </p:nvSpPr>
-        <p:spPr/>
-        <p:txBody>
-          <a:bodyPr/>
-          <a:lstStyle/>
-          <a:p>
-            <a:r>
-              <a:rPr lang="en-US" dirty="0" smtClean="0"/>
-              <a:t>Code Algorithm – </a:t>
-            </a:r>
-            <a:r>
-              <a:rPr lang="en-US" dirty="0" smtClean="0"/>
-              <a:t>Not Straddling </a:t>
+        <p:spPr>
+          <a:xfrm>
+            <a:off x="838200" y="48853"/>
+            <a:ext cx="10515600" cy="1325563"/>
+          </a:xfrm>
+        </p:spPr>
+        <p:txBody>
+          <a:bodyPr/>
+          <a:lstStyle/>
+          <a:p>
+            <a:r>
+              <a:rPr lang="en-US" dirty="0" smtClean="0"/>
+              <a:t>Code Algorithm – Not Straddling </a:t>
             </a:r>
             <a:endParaRPr lang="en-US" dirty="0"/>
           </a:p>
@@ -4162,15 +4366,147 @@
             <p:ph idx="1"/>
           </p:nvPr>
         </p:nvSpPr>
-        <p:spPr/>
-        <p:txBody>
-          <a:bodyPr/>
-          <a:lstStyle/>
-          <a:p>
+        <p:spPr>
+          <a:xfrm>
+            <a:off x="838200" y="3361386"/>
+            <a:ext cx="10515600" cy="3206839"/>
+          </a:xfrm>
+        </p:spPr>
+        <p:txBody>
+          <a:bodyPr>
+            <a:normAutofit fontScale="70000" lnSpcReduction="20000"/>
+          </a:bodyPr>
+          <a:lstStyle/>
+          <a:p>
+            <a:r>
+              <a:rPr lang="en-US" dirty="0" smtClean="0"/>
+              <a:t>In this branch, the code has all of the information, therefore </a:t>
+            </a:r>
+          </a:p>
+          <a:p>
+            <a:pPr lvl="1"/>
+            <a:r>
+              <a:rPr lang="en-US" dirty="0"/>
+              <a:t>Delay 1 = Ignition Delay – Coil Charge Time</a:t>
+            </a:r>
+          </a:p>
+          <a:p>
+            <a:pPr lvl="1"/>
+            <a:r>
+              <a:rPr lang="en-US" dirty="0"/>
+              <a:t>Delay 2 = Coil Charge </a:t>
+            </a:r>
+            <a:r>
+              <a:rPr lang="en-US" dirty="0" smtClean="0"/>
+              <a:t>Time</a:t>
+            </a:r>
+          </a:p>
+          <a:p>
+            <a:pPr marL="0" indent="0">
+              <a:buNone/>
+            </a:pPr>
+            <a:r>
+              <a:rPr lang="en-US" dirty="0" smtClean="0"/>
+              <a:t>Continuing the algorithm</a:t>
+            </a:r>
+          </a:p>
+          <a:p>
+            <a:pPr marL="514350" indent="-514350">
+              <a:buAutoNum type="arabicPeriod" startAt="4"/>
+            </a:pPr>
+            <a:r>
+              <a:rPr lang="en-US" dirty="0" smtClean="0"/>
+              <a:t>Calculate </a:t>
+            </a:r>
+            <a:r>
+              <a:rPr lang="en-US" dirty="0"/>
+              <a:t>each of the delays</a:t>
+            </a:r>
+          </a:p>
+          <a:p>
+            <a:pPr marL="514350" indent="-514350">
+              <a:buAutoNum type="arabicPeriod" startAt="4"/>
+            </a:pPr>
+            <a:r>
+              <a:rPr lang="en-US" dirty="0"/>
+              <a:t>Execute the first delay</a:t>
+            </a:r>
+          </a:p>
+          <a:p>
+            <a:pPr marL="514350" indent="-514350">
+              <a:buAutoNum type="arabicPeriod" startAt="4"/>
+            </a:pPr>
+            <a:r>
+              <a:rPr lang="en-US" dirty="0"/>
+              <a:t>Bring output </a:t>
+            </a:r>
+            <a:r>
+              <a:rPr lang="en-US" dirty="0" smtClean="0"/>
+              <a:t>high</a:t>
+            </a:r>
             <a:endParaRPr lang="en-US" dirty="0"/>
           </a:p>
-        </p:txBody>
-      </p:sp>
+          <a:p>
+            <a:pPr marL="514350" indent="-514350">
+              <a:buAutoNum type="arabicPeriod" startAt="4"/>
+            </a:pPr>
+            <a:r>
+              <a:rPr lang="en-US" dirty="0"/>
+              <a:t>Execute second delay</a:t>
+            </a:r>
+          </a:p>
+          <a:p>
+            <a:pPr marL="514350" indent="-514350">
+              <a:buAutoNum type="arabicPeriod" startAt="4"/>
+            </a:pPr>
+            <a:r>
+              <a:rPr lang="en-US" dirty="0"/>
+              <a:t>Bring output </a:t>
+            </a:r>
+            <a:r>
+              <a:rPr lang="en-US" dirty="0" smtClean="0"/>
+              <a:t>low</a:t>
+            </a:r>
+          </a:p>
+          <a:p>
+            <a:pPr marL="514350" indent="-514350">
+              <a:buAutoNum type="arabicPeriod" startAt="4"/>
+            </a:pPr>
+            <a:r>
+              <a:rPr lang="en-US" dirty="0" smtClean="0"/>
+              <a:t>Repeat</a:t>
+            </a:r>
+            <a:endParaRPr lang="en-US" dirty="0"/>
+          </a:p>
+          <a:p>
+            <a:endParaRPr lang="en-US" dirty="0" smtClean="0"/>
+          </a:p>
+        </p:txBody>
+      </p:sp>
+      <p:pic>
+        <p:nvPicPr>
+          <p:cNvPr id="4" name="Picture 3"/>
+          <p:cNvPicPr>
+            <a:picLocks noChangeAspect="1"/>
+          </p:cNvPicPr>
+          <p:nvPr/>
+        </p:nvPicPr>
+        <p:blipFill>
+          <a:blip r:embed="rId2"/>
+          <a:stretch>
+            <a:fillRect/>
+          </a:stretch>
+        </p:blipFill>
+        <p:spPr>
+          <a:xfrm>
+            <a:off x="2639077" y="962292"/>
+            <a:ext cx="6913845" cy="2399094"/>
+          </a:xfrm>
+          <a:prstGeom prst="rect">
+            <a:avLst/>
+          </a:prstGeom>
+        </p:spPr>
+      </p:pic>
     </p:spTree>
     <p:extLst>
       <p:ext uri="{BB962C8B-B14F-4D97-AF65-F5344CB8AC3E}">
@@ -4256,6 +4592,30 @@
           </a:p>
         </p:txBody>
       </p:sp>
+      <p:pic>
+        <p:nvPicPr>
+          <p:cNvPr id="4" name="Picture 3"/>
+          <p:cNvPicPr>
+            <a:picLocks noChangeAspect="1"/>
+          </p:cNvPicPr>
+          <p:nvPr/>
+        </p:nvPicPr>
+        <p:blipFill>
+          <a:blip r:embed="rId2"/>
+          <a:stretch>
+            <a:fillRect/>
+          </a:stretch>
+        </p:blipFill>
+        <p:spPr>
+          <a:xfrm>
+            <a:off x="3181082" y="2308860"/>
+            <a:ext cx="5820640" cy="4365480"/>
+          </a:xfrm>
+          <a:prstGeom prst="rect">
+            <a:avLst/>
+          </a:prstGeom>
+        </p:spPr>
+      </p:pic>
     </p:spTree>
     <p:extLst>
       <p:ext uri="{BB962C8B-B14F-4D97-AF65-F5344CB8AC3E}">

</xml_diff>

<commit_message>
Updated CDR with Schematics for PCB
</commit_message>
<xml_diff>
--- a/DESIGN_DOCUMENTATION/Critical_Design_Review.Flux_Capacitors.pptx
+++ b/DESIGN_DOCUMENTATION/Critical_Design_Review.Flux_Capacitors.pptx
@@ -255,7 +255,7 @@
           <a:p>
             <a:fld id="{787E658A-0394-41A6-B8C4-29771C2E23E9}" type="datetimeFigureOut">
               <a:rPr lang="en-US" smtClean="0"/>
-              <a:t>2/29/2016</a:t>
+              <a:t>3/2/2016</a:t>
             </a:fld>
             <a:endParaRPr lang="en-US"/>
           </a:p>
@@ -425,7 +425,7 @@
           <a:p>
             <a:fld id="{787E658A-0394-41A6-B8C4-29771C2E23E9}" type="datetimeFigureOut">
               <a:rPr lang="en-US" smtClean="0"/>
-              <a:t>2/29/2016</a:t>
+              <a:t>3/2/2016</a:t>
             </a:fld>
             <a:endParaRPr lang="en-US"/>
           </a:p>
@@ -605,7 +605,7 @@
           <a:p>
             <a:fld id="{787E658A-0394-41A6-B8C4-29771C2E23E9}" type="datetimeFigureOut">
               <a:rPr lang="en-US" smtClean="0"/>
-              <a:t>2/29/2016</a:t>
+              <a:t>3/2/2016</a:t>
             </a:fld>
             <a:endParaRPr lang="en-US"/>
           </a:p>
@@ -775,7 +775,7 @@
           <a:p>
             <a:fld id="{787E658A-0394-41A6-B8C4-29771C2E23E9}" type="datetimeFigureOut">
               <a:rPr lang="en-US" smtClean="0"/>
-              <a:t>2/29/2016</a:t>
+              <a:t>3/2/2016</a:t>
             </a:fld>
             <a:endParaRPr lang="en-US"/>
           </a:p>
@@ -1021,7 +1021,7 @@
           <a:p>
             <a:fld id="{787E658A-0394-41A6-B8C4-29771C2E23E9}" type="datetimeFigureOut">
               <a:rPr lang="en-US" smtClean="0"/>
-              <a:t>2/29/2016</a:t>
+              <a:t>3/2/2016</a:t>
             </a:fld>
             <a:endParaRPr lang="en-US"/>
           </a:p>
@@ -1253,7 +1253,7 @@
           <a:p>
             <a:fld id="{787E658A-0394-41A6-B8C4-29771C2E23E9}" type="datetimeFigureOut">
               <a:rPr lang="en-US" smtClean="0"/>
-              <a:t>2/29/2016</a:t>
+              <a:t>3/2/2016</a:t>
             </a:fld>
             <a:endParaRPr lang="en-US"/>
           </a:p>
@@ -1620,7 +1620,7 @@
           <a:p>
             <a:fld id="{787E658A-0394-41A6-B8C4-29771C2E23E9}" type="datetimeFigureOut">
               <a:rPr lang="en-US" smtClean="0"/>
-              <a:t>2/29/2016</a:t>
+              <a:t>3/2/2016</a:t>
             </a:fld>
             <a:endParaRPr lang="en-US"/>
           </a:p>
@@ -1738,7 +1738,7 @@
           <a:p>
             <a:fld id="{787E658A-0394-41A6-B8C4-29771C2E23E9}" type="datetimeFigureOut">
               <a:rPr lang="en-US" smtClean="0"/>
-              <a:t>2/29/2016</a:t>
+              <a:t>3/2/2016</a:t>
             </a:fld>
             <a:endParaRPr lang="en-US"/>
           </a:p>
@@ -1833,7 +1833,7 @@
           <a:p>
             <a:fld id="{787E658A-0394-41A6-B8C4-29771C2E23E9}" type="datetimeFigureOut">
               <a:rPr lang="en-US" smtClean="0"/>
-              <a:t>2/29/2016</a:t>
+              <a:t>3/2/2016</a:t>
             </a:fld>
             <a:endParaRPr lang="en-US"/>
           </a:p>
@@ -2110,7 +2110,7 @@
           <a:p>
             <a:fld id="{787E658A-0394-41A6-B8C4-29771C2E23E9}" type="datetimeFigureOut">
               <a:rPr lang="en-US" smtClean="0"/>
-              <a:t>2/29/2016</a:t>
+              <a:t>3/2/2016</a:t>
             </a:fld>
             <a:endParaRPr lang="en-US"/>
           </a:p>
@@ -2363,7 +2363,7 @@
           <a:p>
             <a:fld id="{787E658A-0394-41A6-B8C4-29771C2E23E9}" type="datetimeFigureOut">
               <a:rPr lang="en-US" smtClean="0"/>
-              <a:t>2/29/2016</a:t>
+              <a:t>3/2/2016</a:t>
             </a:fld>
             <a:endParaRPr lang="en-US"/>
           </a:p>
@@ -2576,7 +2576,7 @@
           <a:p>
             <a:fld id="{787E658A-0394-41A6-B8C4-29771C2E23E9}" type="datetimeFigureOut">
               <a:rPr lang="en-US" smtClean="0"/>
-              <a:t>2/29/2016</a:t>
+              <a:t>3/2/2016</a:t>
             </a:fld>
             <a:endParaRPr lang="en-US"/>
           </a:p>
@@ -3113,12 +3113,29 @@
           </a:xfrm>
         </p:spPr>
         <p:txBody>
-          <a:bodyPr/>
-          <a:lstStyle/>
-          <a:p>
-            <a:r>
-              <a:rPr lang="en-US" dirty="0" smtClean="0"/>
-              <a:t>Build PCB </a:t>
+          <a:bodyPr>
+            <a:normAutofit fontScale="85000" lnSpcReduction="20000"/>
+          </a:bodyPr>
+          <a:lstStyle/>
+          <a:p>
+            <a:r>
+              <a:rPr lang="en-US" dirty="0" smtClean="0"/>
+              <a:t>Finish PCB layout in </a:t>
+            </a:r>
+            <a:r>
+              <a:rPr lang="en-US" dirty="0" err="1" smtClean="0"/>
+              <a:t>ultiboard</a:t>
+            </a:r>
+            <a:endParaRPr lang="en-US" dirty="0" smtClean="0"/>
+          </a:p>
+          <a:p>
+            <a:r>
+              <a:rPr lang="en-US" dirty="0" smtClean="0"/>
+              <a:t>Build </a:t>
+            </a:r>
+            <a:r>
+              <a:rPr lang="en-US" dirty="0" smtClean="0"/>
+              <a:t>PCB </a:t>
             </a:r>
           </a:p>
           <a:p>
@@ -3493,11 +3510,7 @@
           <a:p>
             <a:r>
               <a:rPr lang="en-US" dirty="0" smtClean="0"/>
-              <a:t>We chose to divide it up like so, because Calvin has more familiarity with the function of the ignition system</a:t>
-            </a:r>
-            <a:r>
-              <a:rPr lang="en-US" dirty="0" smtClean="0"/>
-              <a:t>.</a:t>
+              <a:t>We chose to divide it up like so, because Calvin has more familiarity with the function of the ignition system.</a:t>
             </a:r>
           </a:p>
           <a:p>
@@ -4656,7 +4669,12 @@
             <p:ph type="title"/>
           </p:nvPr>
         </p:nvSpPr>
-        <p:spPr/>
+        <p:spPr>
+          <a:xfrm>
+            <a:off x="838200" y="-49425"/>
+            <a:ext cx="10515600" cy="1325563"/>
+          </a:xfrm>
+        </p:spPr>
         <p:txBody>
           <a:bodyPr/>
           <a:lstStyle/>
@@ -4669,25 +4687,83 @@
           </a:p>
         </p:txBody>
       </p:sp>
-      <p:sp>
-        <p:nvSpPr>
-          <p:cNvPr id="3" name="Content Placeholder 2"/>
-          <p:cNvSpPr>
-            <a:spLocks noGrp="1"/>
-          </p:cNvSpPr>
+      <p:pic>
+        <p:nvPicPr>
+          <p:cNvPr id="4" name="Content Placeholder 3"/>
+          <p:cNvPicPr>
+            <a:picLocks noGrp="1" noChangeAspect="1"/>
+          </p:cNvPicPr>
           <p:nvPr>
             <p:ph idx="1"/>
           </p:nvPr>
-        </p:nvSpPr>
-        <p:spPr/>
-        <p:txBody>
-          <a:bodyPr/>
-          <a:lstStyle/>
-          <a:p>
-            <a:endParaRPr lang="en-US"/>
-          </a:p>
-        </p:txBody>
-      </p:sp>
+        </p:nvPicPr>
+        <p:blipFill>
+          <a:blip r:embed="rId2">
+            <a:extLst>
+              <a:ext uri="{28A0092B-C50C-407E-A947-70E740481C1C}">
+                <a14:useLocalDpi xmlns:a14="http://schemas.microsoft.com/office/drawing/2010/main" val="0"/>
+              </a:ext>
+            </a:extLst>
+          </a:blip>
+          <a:stretch>
+            <a:fillRect/>
+          </a:stretch>
+        </p:blipFill>
+        <p:spPr>
+          <a:xfrm>
+            <a:off x="2602605" y="851135"/>
+            <a:ext cx="6357126" cy="2742070"/>
+          </a:xfrm>
+        </p:spPr>
+      </p:pic>
+      <p:pic>
+        <p:nvPicPr>
+          <p:cNvPr id="5" name="Picture 4"/>
+          <p:cNvPicPr>
+            <a:picLocks noChangeAspect="1"/>
+          </p:cNvPicPr>
+          <p:nvPr/>
+        </p:nvPicPr>
+        <p:blipFill>
+          <a:blip r:embed="rId3"/>
+          <a:stretch>
+            <a:fillRect/>
+          </a:stretch>
+        </p:blipFill>
+        <p:spPr>
+          <a:xfrm>
+            <a:off x="619259" y="3860465"/>
+            <a:ext cx="5061500" cy="2731426"/>
+          </a:xfrm>
+          <a:prstGeom prst="rect">
+            <a:avLst/>
+          </a:prstGeom>
+        </p:spPr>
+      </p:pic>
+      <p:pic>
+        <p:nvPicPr>
+          <p:cNvPr id="7" name="Picture 6"/>
+          <p:cNvPicPr>
+            <a:picLocks noChangeAspect="1"/>
+          </p:cNvPicPr>
+          <p:nvPr/>
+        </p:nvPicPr>
+        <p:blipFill>
+          <a:blip r:embed="rId4"/>
+          <a:stretch>
+            <a:fillRect/>
+          </a:stretch>
+        </p:blipFill>
+        <p:spPr>
+          <a:xfrm>
+            <a:off x="5909320" y="3860465"/>
+            <a:ext cx="5243081" cy="2731426"/>
+          </a:xfrm>
+          <a:prstGeom prst="rect">
+            <a:avLst/>
+          </a:prstGeom>
+        </p:spPr>
+      </p:pic>
     </p:spTree>
     <p:extLst>
       <p:ext uri="{BB962C8B-B14F-4D97-AF65-F5344CB8AC3E}">

</xml_diff>